<commit_message>
Began Screen script, added end slide
</commit_message>
<xml_diff>
--- a/Miscellaneous/Slides.pptx
+++ b/Miscellaneous/Slides.pptx
@@ -5,7 +5,7 @@
     <p:sldMasterId id="2147483942" r:id="rId1"/>
   </p:sldMasterIdLst>
   <p:notesMasterIdLst>
-    <p:notesMasterId r:id="rId20"/>
+    <p:notesMasterId r:id="rId21"/>
   </p:notesMasterIdLst>
   <p:sldIdLst>
     <p:sldId id="266" r:id="rId2"/>
@@ -26,6 +26,7 @@
     <p:sldId id="275" r:id="rId17"/>
     <p:sldId id="276" r:id="rId18"/>
     <p:sldId id="277" r:id="rId19"/>
+    <p:sldId id="282" r:id="rId20"/>
   </p:sldIdLst>
   <p:sldSz cx="12192000" cy="6858000"/>
   <p:notesSz cx="6858000" cy="9144000"/>
@@ -30808,6 +30809,71 @@
 </p:sld>
 </file>
 
+<file path=ppt/slides/slide19.xml><?xml version="1.0" encoding="utf-8"?>
+<p:sld xmlns:a="http://schemas.openxmlformats.org/drawingml/2006/main" xmlns:r="http://schemas.openxmlformats.org/officeDocument/2006/relationships" xmlns:p="http://schemas.openxmlformats.org/presentationml/2006/main">
+  <p:cSld>
+    <p:spTree>
+      <p:nvGrpSpPr>
+        <p:cNvPr id="1" name=""/>
+        <p:cNvGrpSpPr/>
+        <p:nvPr/>
+      </p:nvGrpSpPr>
+      <p:grpSpPr>
+        <a:xfrm>
+          <a:off x="0" y="0"/>
+          <a:ext cx="0" cy="0"/>
+          <a:chOff x="0" y="0"/>
+          <a:chExt cx="0" cy="0"/>
+        </a:xfrm>
+      </p:grpSpPr>
+      <p:sp>
+        <p:nvSpPr>
+          <p:cNvPr id="2" name="Title 1">
+            <a:extLst>
+              <a:ext uri="{FF2B5EF4-FFF2-40B4-BE49-F238E27FC236}">
+                <a16:creationId xmlns:a16="http://schemas.microsoft.com/office/drawing/2014/main" id="{C93B7585-033C-5E4C-AAF2-49051D4EF0FA}"/>
+              </a:ext>
+            </a:extLst>
+          </p:cNvPr>
+          <p:cNvSpPr>
+            <a:spLocks noGrp="1"/>
+          </p:cNvSpPr>
+          <p:nvPr>
+            <p:ph type="ctrTitle"/>
+          </p:nvPr>
+        </p:nvSpPr>
+        <p:spPr/>
+        <p:txBody>
+          <a:bodyPr/>
+          <a:lstStyle/>
+          <a:p>
+            <a:r>
+              <a:rPr lang="en-US" dirty="0"/>
+              <a:t>End of </a:t>
+            </a:r>
+            <a:br>
+              <a:rPr lang="en-US" dirty="0"/>
+            </a:br>
+            <a:r>
+              <a:rPr lang="en-US" dirty="0"/>
+              <a:t>slides</a:t>
+            </a:r>
+          </a:p>
+        </p:txBody>
+      </p:sp>
+    </p:spTree>
+    <p:extLst>
+      <p:ext uri="{BB962C8B-B14F-4D97-AF65-F5344CB8AC3E}">
+        <p14:creationId xmlns:p14="http://schemas.microsoft.com/office/powerpoint/2010/main" val="3642467586"/>
+      </p:ext>
+    </p:extLst>
+  </p:cSld>
+  <p:clrMapOvr>
+    <a:masterClrMapping/>
+  </p:clrMapOvr>
+</p:sld>
+</file>
+
 <file path=ppt/slides/slide2.xml><?xml version="1.0" encoding="utf-8"?>
 <p:sld xmlns:a="http://schemas.openxmlformats.org/drawingml/2006/main" xmlns:r="http://schemas.openxmlformats.org/officeDocument/2006/relationships" xmlns:p="http://schemas.openxmlformats.org/presentationml/2006/main">
   <p:cSld>

</xml_diff>